<commit_message>
Updated Pattern for Presentation Layer
Updated presentation layer pattern
</commit_message>
<xml_diff>
--- a/9000_Images/Images.pptx
+++ b/9000_Images/Images.pptx
@@ -7,7 +7,7 @@
     <p:sldMasterId id="2147483673" r:id="rId3"/>
   </p:sldMasterIdLst>
   <p:notesMasterIdLst>
-    <p:notesMasterId r:id="rId14"/>
+    <p:notesMasterId r:id="rId16"/>
   </p:notesMasterIdLst>
   <p:sldIdLst>
     <p:sldId id="266" r:id="rId4"/>
@@ -19,7 +19,9 @@
     <p:sldId id="268" r:id="rId10"/>
     <p:sldId id="260" r:id="rId11"/>
     <p:sldId id="261" r:id="rId12"/>
-    <p:sldId id="262" r:id="rId13"/>
+    <p:sldId id="271" r:id="rId13"/>
+    <p:sldId id="270" r:id="rId14"/>
+    <p:sldId id="272" r:id="rId15"/>
   </p:sldIdLst>
   <p:sldSz cx="9144000" cy="6858000" type="screen4x3"/>
   <p:notesSz cx="6858000" cy="9144000"/>
@@ -2592,7 +2594,7 @@
           <a:p>
             <a:fld id="{3F99826A-3FCD-4C97-9E7F-673D53AC6244}" type="datetimeFigureOut">
               <a:rPr lang="en-AU" smtClean="0"/>
-              <a:t>25/03/2018</a:t>
+              <a:t>5/09/2018</a:t>
             </a:fld>
             <a:endParaRPr lang="en-AU"/>
           </a:p>
@@ -3144,7 +3146,7 @@
           <a:p>
             <a:fld id="{B554742D-B907-4090-BEE2-AD4D42C9E164}" type="datetimeFigureOut">
               <a:rPr lang="en-AU" smtClean="0"/>
-              <a:t>25/03/2018</a:t>
+              <a:t>5/09/2018</a:t>
             </a:fld>
             <a:endParaRPr lang="en-AU"/>
           </a:p>
@@ -3314,7 +3316,7 @@
           <a:p>
             <a:fld id="{B554742D-B907-4090-BEE2-AD4D42C9E164}" type="datetimeFigureOut">
               <a:rPr lang="en-AU" smtClean="0"/>
-              <a:t>25/03/2018</a:t>
+              <a:t>5/09/2018</a:t>
             </a:fld>
             <a:endParaRPr lang="en-AU"/>
           </a:p>
@@ -3494,7 +3496,7 @@
           <a:p>
             <a:fld id="{B554742D-B907-4090-BEE2-AD4D42C9E164}" type="datetimeFigureOut">
               <a:rPr lang="en-AU" smtClean="0"/>
-              <a:t>25/03/2018</a:t>
+              <a:t>5/09/2018</a:t>
             </a:fld>
             <a:endParaRPr lang="en-AU"/>
           </a:p>
@@ -3766,7 +3768,7 @@
           <a:graphicData uri="http://schemas.openxmlformats.org/presentationml/2006/ole">
             <mc:AlternateContent xmlns:mc="http://schemas.openxmlformats.org/markup-compatibility/2006">
               <mc:Choice xmlns:v="urn:schemas-microsoft-com:vml" Requires="v">
-                <p:oleObj spid="_x0000_s3088" name="think-cell Slide" r:id="rId4" imgW="270" imgH="270" progId="TCLayout.ActiveDocument.1">
+                <p:oleObj spid="_x0000_s3096" name="think-cell Slide" r:id="rId4" imgW="270" imgH="270" progId="TCLayout.ActiveDocument.1">
                   <p:embed/>
                 </p:oleObj>
               </mc:Choice>
@@ -4264,7 +4266,7 @@
           <a:p>
             <a:fld id="{B554742D-B907-4090-BEE2-AD4D42C9E164}" type="datetimeFigureOut">
               <a:rPr lang="en-AU" smtClean="0"/>
-              <a:t>25/03/2018</a:t>
+              <a:t>5/09/2018</a:t>
             </a:fld>
             <a:endParaRPr lang="en-AU"/>
           </a:p>
@@ -4483,7 +4485,7 @@
           <a:graphicData uri="http://schemas.openxmlformats.org/presentationml/2006/ole">
             <mc:AlternateContent xmlns:mc="http://schemas.openxmlformats.org/markup-compatibility/2006">
               <mc:Choice xmlns:v="urn:schemas-microsoft-com:vml" Requires="v">
-                <p:oleObj spid="_x0000_s7184" name="think-cell Slide" r:id="rId4" imgW="270" imgH="270" progId="TCLayout.ActiveDocument.1">
+                <p:oleObj spid="_x0000_s7192" name="think-cell Slide" r:id="rId4" imgW="270" imgH="270" progId="TCLayout.ActiveDocument.1">
                   <p:embed/>
                 </p:oleObj>
               </mc:Choice>
@@ -4896,7 +4898,7 @@
           <a:p>
             <a:fld id="{B554742D-B907-4090-BEE2-AD4D42C9E164}" type="datetimeFigureOut">
               <a:rPr lang="en-AU" smtClean="0"/>
-              <a:t>25/03/2018</a:t>
+              <a:t>5/09/2018</a:t>
             </a:fld>
             <a:endParaRPr lang="en-AU"/>
           </a:p>
@@ -5184,7 +5186,7 @@
           <a:p>
             <a:fld id="{B554742D-B907-4090-BEE2-AD4D42C9E164}" type="datetimeFigureOut">
               <a:rPr lang="en-AU" smtClean="0"/>
-              <a:t>25/03/2018</a:t>
+              <a:t>5/09/2018</a:t>
             </a:fld>
             <a:endParaRPr lang="en-AU"/>
           </a:p>
@@ -5606,7 +5608,7 @@
           <a:p>
             <a:fld id="{B554742D-B907-4090-BEE2-AD4D42C9E164}" type="datetimeFigureOut">
               <a:rPr lang="en-AU" smtClean="0"/>
-              <a:t>25/03/2018</a:t>
+              <a:t>5/09/2018</a:t>
             </a:fld>
             <a:endParaRPr lang="en-AU"/>
           </a:p>
@@ -5724,7 +5726,7 @@
           <a:p>
             <a:fld id="{B554742D-B907-4090-BEE2-AD4D42C9E164}" type="datetimeFigureOut">
               <a:rPr lang="en-AU" smtClean="0"/>
-              <a:t>25/03/2018</a:t>
+              <a:t>5/09/2018</a:t>
             </a:fld>
             <a:endParaRPr lang="en-AU"/>
           </a:p>
@@ -5819,7 +5821,7 @@
           <a:p>
             <a:fld id="{B554742D-B907-4090-BEE2-AD4D42C9E164}" type="datetimeFigureOut">
               <a:rPr lang="en-AU" smtClean="0"/>
-              <a:t>25/03/2018</a:t>
+              <a:t>5/09/2018</a:t>
             </a:fld>
             <a:endParaRPr lang="en-AU"/>
           </a:p>
@@ -6096,7 +6098,7 @@
           <a:p>
             <a:fld id="{B554742D-B907-4090-BEE2-AD4D42C9E164}" type="datetimeFigureOut">
               <a:rPr lang="en-AU" smtClean="0"/>
-              <a:t>25/03/2018</a:t>
+              <a:t>5/09/2018</a:t>
             </a:fld>
             <a:endParaRPr lang="en-AU"/>
           </a:p>
@@ -6349,7 +6351,7 @@
           <a:p>
             <a:fld id="{B554742D-B907-4090-BEE2-AD4D42C9E164}" type="datetimeFigureOut">
               <a:rPr lang="en-AU" smtClean="0"/>
-              <a:t>25/03/2018</a:t>
+              <a:t>5/09/2018</a:t>
             </a:fld>
             <a:endParaRPr lang="en-AU"/>
           </a:p>
@@ -6562,7 +6564,7 @@
           <a:p>
             <a:fld id="{B554742D-B907-4090-BEE2-AD4D42C9E164}" type="datetimeFigureOut">
               <a:rPr lang="en-AU" smtClean="0"/>
-              <a:t>25/03/2018</a:t>
+              <a:t>5/09/2018</a:t>
             </a:fld>
             <a:endParaRPr lang="en-AU"/>
           </a:p>
@@ -6970,7 +6972,7 @@
           <a:graphicData uri="http://schemas.openxmlformats.org/presentationml/2006/ole">
             <mc:AlternateContent xmlns:mc="http://schemas.openxmlformats.org/markup-compatibility/2006">
               <mc:Choice xmlns:v="urn:schemas-microsoft-com:vml" Requires="v">
-                <p:oleObj spid="_x0000_s1040" name="think-cell Slide" r:id="rId27" imgW="270" imgH="270" progId="TCLayout.ActiveDocument.1">
+                <p:oleObj spid="_x0000_s1048" name="think-cell Slide" r:id="rId27" imgW="270" imgH="270" progId="TCLayout.ActiveDocument.1">
                   <p:embed/>
                 </p:oleObj>
               </mc:Choice>
@@ -10994,7 +10996,7 @@
           <a:graphicData uri="http://schemas.openxmlformats.org/presentationml/2006/ole">
             <mc:AlternateContent xmlns:mc="http://schemas.openxmlformats.org/markup-compatibility/2006">
               <mc:Choice xmlns:v="urn:schemas-microsoft-com:vml" Requires="v">
-                <p:oleObj spid="_x0000_s5136" name="think-cell Slide" r:id="rId28" imgW="270" imgH="270" progId="TCLayout.ActiveDocument.1">
+                <p:oleObj spid="_x0000_s5144" name="think-cell Slide" r:id="rId28" imgW="270" imgH="270" progId="TCLayout.ActiveDocument.1">
                   <p:embed/>
                 </p:oleObj>
               </mc:Choice>
@@ -16267,8 +16269,8 @@
         </p:nvSpPr>
         <p:spPr>
           <a:xfrm>
-            <a:off x="2194274" y="3252378"/>
-            <a:ext cx="4747898" cy="432048"/>
+            <a:off x="1306195" y="3645024"/>
+            <a:ext cx="4926618" cy="432048"/>
           </a:xfrm>
           <a:prstGeom prst="rect">
             <a:avLst/>
@@ -16307,8 +16309,8 @@
         </p:nvSpPr>
         <p:spPr>
           <a:xfrm>
-            <a:off x="2189644" y="1268761"/>
-            <a:ext cx="4752528" cy="1912464"/>
+            <a:off x="1301564" y="1268002"/>
+            <a:ext cx="4926619" cy="2304255"/>
           </a:xfrm>
           <a:prstGeom prst="rect">
             <a:avLst/>
@@ -16347,8 +16349,8 @@
         </p:nvSpPr>
         <p:spPr>
           <a:xfrm>
-            <a:off x="2189644" y="764704"/>
-            <a:ext cx="4752528" cy="432048"/>
+            <a:off x="1299200" y="764704"/>
+            <a:ext cx="4926618" cy="432048"/>
           </a:xfrm>
           <a:prstGeom prst="rect">
             <a:avLst/>
@@ -16392,8 +16394,8 @@
         </p:nvSpPr>
         <p:spPr>
           <a:xfrm>
-            <a:off x="4474102" y="1331148"/>
-            <a:ext cx="1800200" cy="576064"/>
+            <a:off x="3899944" y="1330390"/>
+            <a:ext cx="2177519" cy="576064"/>
           </a:xfrm>
           <a:prstGeom prst="roundRect">
             <a:avLst/>
@@ -16442,7 +16444,7 @@
                   </a:schemeClr>
                 </a:solidFill>
               </a:rPr>
-              <a:t>View</a:t>
+              <a:t>Decoupling View</a:t>
             </a:r>
             <a:r>
               <a:rPr lang="en-AU" sz="1050" dirty="0">
@@ -16478,8 +16480,8 @@
         </p:nvSpPr>
         <p:spPr>
           <a:xfrm>
-            <a:off x="2529886" y="1331148"/>
-            <a:ext cx="1944216" cy="576064"/>
+            <a:off x="1451673" y="1330390"/>
+            <a:ext cx="2177522" cy="576064"/>
           </a:xfrm>
           <a:prstGeom prst="roundRect">
             <a:avLst/>
@@ -16528,7 +16530,7 @@
                   </a:schemeClr>
                 </a:solidFill>
               </a:rPr>
-              <a:t>View</a:t>
+              <a:t>Decoupling View</a:t>
             </a:r>
           </a:p>
           <a:p>
@@ -16554,8 +16556,8 @@
         </p:nvSpPr>
         <p:spPr>
           <a:xfrm>
-            <a:off x="2529886" y="1909456"/>
-            <a:ext cx="1944216" cy="576064"/>
+            <a:off x="1451673" y="1908698"/>
+            <a:ext cx="2177522" cy="576064"/>
           </a:xfrm>
           <a:prstGeom prst="roundRect">
             <a:avLst/>
@@ -16608,7 +16610,11 @@
             </a:r>
           </a:p>
           <a:p>
-            <a:pPr algn="ctr"/>
+            <a:pPr algn="ctr">
+              <a:tabLst>
+                <a:tab pos="82550" algn="l"/>
+              </a:tabLst>
+            </a:pPr>
             <a:r>
               <a:rPr lang="en-AU" sz="1050" dirty="0">
                 <a:solidFill>
@@ -16617,7 +16623,7 @@
                   </a:schemeClr>
                 </a:solidFill>
               </a:rPr>
-              <a:t>(physical storage for performance reason)</a:t>
+              <a:t>(physical storage for performance reason, if required)</a:t>
             </a:r>
           </a:p>
         </p:txBody>
@@ -16630,8 +16636,8 @@
         </p:nvSpPr>
         <p:spPr>
           <a:xfrm>
-            <a:off x="2529886" y="2485520"/>
-            <a:ext cx="1944216" cy="576064"/>
+            <a:off x="1451673" y="2484762"/>
+            <a:ext cx="2177522" cy="576064"/>
           </a:xfrm>
           <a:prstGeom prst="roundRect">
             <a:avLst/>
@@ -16680,8 +16686,18 @@
                   </a:schemeClr>
                 </a:solidFill>
               </a:rPr>
-              <a:t>View</a:t>
+              <a:t>Logic View</a:t>
             </a:r>
+            <a:endParaRPr lang="en-AU" sz="1050" dirty="0">
+              <a:solidFill>
+                <a:schemeClr val="accent1">
+                  <a:lumMod val="50000"/>
+                </a:schemeClr>
+              </a:solidFill>
+            </a:endParaRPr>
+          </a:p>
+          <a:p>
+            <a:pPr algn="ctr"/>
             <a:r>
               <a:rPr lang="en-AU" sz="1050" dirty="0">
                 <a:solidFill>
@@ -16690,19 +16706,6 @@
                   </a:schemeClr>
                 </a:solidFill>
               </a:rPr>
-              <a:t> - Logic</a:t>
-            </a:r>
-          </a:p>
-          <a:p>
-            <a:pPr algn="ctr"/>
-            <a:r>
-              <a:rPr lang="en-AU" sz="1050" dirty="0">
-                <a:solidFill>
-                  <a:schemeClr val="accent1">
-                    <a:lumMod val="50000"/>
-                  </a:schemeClr>
-                </a:solidFill>
-              </a:rPr>
               <a:t>(join and business logic)</a:t>
             </a:r>
           </a:p>
@@ -16716,7 +16719,7 @@
         </p:nvSpPr>
         <p:spPr>
           <a:xfrm>
-            <a:off x="5067599" y="2754048"/>
+            <a:off x="2826405" y="3243137"/>
             <a:ext cx="1872208" cy="307777"/>
           </a:xfrm>
           <a:prstGeom prst="rect">
@@ -16730,6 +16733,7 @@
           </a:bodyPr>
           <a:lstStyle/>
           <a:p>
+            <a:pPr algn="ctr"/>
             <a:r>
               <a:rPr lang="en-AU" sz="1400" dirty="0">
                 <a:solidFill>
@@ -16749,7 +16753,7 @@
         </p:nvSpPr>
         <p:spPr>
           <a:xfrm>
-            <a:off x="5071985" y="3314513"/>
+            <a:off x="2833400" y="3719132"/>
             <a:ext cx="1872208" cy="307777"/>
           </a:xfrm>
           <a:prstGeom prst="rect">
@@ -16763,6 +16767,7 @@
           </a:bodyPr>
           <a:lstStyle/>
           <a:p>
+            <a:pPr algn="ctr"/>
             <a:r>
               <a:rPr lang="en-AU" sz="1400" dirty="0">
                 <a:solidFill>
@@ -16782,7 +16787,7 @@
         </p:nvSpPr>
         <p:spPr>
           <a:xfrm>
-            <a:off x="5071985" y="826839"/>
+            <a:off x="2826405" y="826081"/>
             <a:ext cx="1872208" cy="307777"/>
           </a:xfrm>
           <a:prstGeom prst="rect">
@@ -16796,6 +16801,7 @@
           </a:bodyPr>
           <a:lstStyle/>
           <a:p>
+            <a:pPr algn="ctr"/>
             <a:r>
               <a:rPr lang="en-AU" sz="1400" dirty="0">
                 <a:solidFill>
@@ -16815,7 +16821,7 @@
         </p:nvCxnSpPr>
         <p:spPr>
           <a:xfrm flipV="1">
-            <a:off x="2765708" y="2301932"/>
+            <a:off x="1687495" y="2301174"/>
             <a:ext cx="0" cy="367175"/>
           </a:xfrm>
           <a:prstGeom prst="line">
@@ -16840,39 +16846,6 @@
           </a:fontRef>
         </p:style>
       </p:cxnSp>
-      <p:cxnSp>
-        <p:nvCxnSpPr>
-          <p:cNvPr id="18" name="Straight Connector 17"/>
-          <p:cNvCxnSpPr/>
-          <p:nvPr/>
-        </p:nvCxnSpPr>
-        <p:spPr>
-          <a:xfrm flipV="1">
-            <a:off x="4781932" y="1725868"/>
-            <a:ext cx="0" cy="1638943"/>
-          </a:xfrm>
-          <a:prstGeom prst="line">
-            <a:avLst/>
-          </a:prstGeom>
-          <a:ln>
-            <a:tailEnd type="arrow"/>
-          </a:ln>
-        </p:spPr>
-        <p:style>
-          <a:lnRef idx="3">
-            <a:schemeClr val="accent2"/>
-          </a:lnRef>
-          <a:fillRef idx="0">
-            <a:schemeClr val="accent2"/>
-          </a:fillRef>
-          <a:effectRef idx="2">
-            <a:schemeClr val="accent2"/>
-          </a:effectRef>
-          <a:fontRef idx="minor">
-            <a:schemeClr val="tx1"/>
-          </a:fontRef>
-        </p:style>
-      </p:cxnSp>
       <p:sp>
         <p:nvSpPr>
           <p:cNvPr id="22" name="TextBox 21"/>
@@ -16881,7 +16854,7 @@
         </p:nvSpPr>
         <p:spPr>
           <a:xfrm>
-            <a:off x="6948264" y="1341147"/>
+            <a:off x="6228184" y="979970"/>
             <a:ext cx="2010132" cy="769441"/>
           </a:xfrm>
           <a:prstGeom prst="rect">
@@ -16898,7 +16871,7 @@
             <a:pPr algn="ctr"/>
             <a:r>
               <a:rPr lang="en-AU" sz="1100" dirty="0"/>
-              <a:t>The decoupling views are effectively the Dimensional Model (or other Mart types) as exposed to BI</a:t>
+              <a:t>The decoupling views are effectively the Dimensional Model (or other Mart types) as exposed to BI.</a:t>
             </a:r>
           </a:p>
         </p:txBody>
@@ -16911,8 +16884,8 @@
         </p:nvSpPr>
         <p:spPr>
           <a:xfrm>
-            <a:off x="6948264" y="2228196"/>
-            <a:ext cx="2232248" cy="600164"/>
+            <a:off x="6228184" y="1867019"/>
+            <a:ext cx="2232248" cy="769441"/>
           </a:xfrm>
           <a:prstGeom prst="rect">
             <a:avLst/>
@@ -16928,7 +16901,7 @@
             <a:pPr algn="ctr"/>
             <a:r>
               <a:rPr lang="en-AU" sz="1100" dirty="0"/>
-              <a:t>Fully virtual Data Marts are recommended, as most BI solutions are either MOLAP or in-memory.</a:t>
+              <a:t>Fully virtual Data Marts are recommended if performance allows for this, as most BI solutions are either MOLAP or in-memory.</a:t>
             </a:r>
           </a:p>
         </p:txBody>
@@ -16941,7 +16914,7 @@
         </p:nvSpPr>
         <p:spPr>
           <a:xfrm>
-            <a:off x="899733" y="1517041"/>
+            <a:off x="11654" y="1516283"/>
             <a:ext cx="1240888" cy="261610"/>
           </a:xfrm>
           <a:prstGeom prst="rect">
@@ -16958,7 +16931,7 @@
             <a:pPr algn="ctr"/>
             <a:r>
               <a:rPr lang="en-AU" sz="1100" b="1" dirty="0" err="1"/>
-              <a:t>dbo</a:t>
+              <a:t>pres</a:t>
             </a:r>
             <a:r>
               <a:rPr lang="en-AU" sz="1100" b="1" dirty="0"/>
@@ -16975,7 +16948,7 @@
         </p:nvSpPr>
         <p:spPr>
           <a:xfrm>
-            <a:off x="903904" y="2374561"/>
+            <a:off x="15825" y="2373803"/>
             <a:ext cx="1240888" cy="261610"/>
           </a:xfrm>
           <a:prstGeom prst="rect">
@@ -17000,13 +16973,15 @@
       <p:cxnSp>
         <p:nvCxnSpPr>
           <p:cNvPr id="15" name="Straight Connector 14"/>
-          <p:cNvCxnSpPr/>
+          <p:cNvCxnSpPr>
+            <a:cxnSpLocks/>
+          </p:cNvCxnSpPr>
           <p:nvPr/>
         </p:nvCxnSpPr>
         <p:spPr>
           <a:xfrm flipV="1">
-            <a:off x="2765708" y="2924945"/>
-            <a:ext cx="0" cy="439866"/>
+            <a:off x="1687495" y="2924188"/>
+            <a:ext cx="0" cy="901068"/>
           </a:xfrm>
           <a:prstGeom prst="line">
             <a:avLst/>
@@ -17038,7 +17013,7 @@
         </p:nvCxnSpPr>
         <p:spPr>
           <a:xfrm flipV="1">
-            <a:off x="2765708" y="1725868"/>
+            <a:off x="1687495" y="1725110"/>
             <a:ext cx="0" cy="367175"/>
           </a:xfrm>
           <a:prstGeom prst="line">
@@ -17071,7 +17046,7 @@
         </p:nvSpPr>
         <p:spPr>
           <a:xfrm>
-            <a:off x="1973620" y="1412776"/>
+            <a:off x="1085541" y="1412018"/>
             <a:ext cx="144016" cy="496680"/>
           </a:xfrm>
           <a:prstGeom prst="leftBrace">
@@ -17109,7 +17084,7 @@
         </p:nvSpPr>
         <p:spPr>
           <a:xfrm>
-            <a:off x="1973620" y="1949148"/>
+            <a:off x="1085541" y="1948390"/>
             <a:ext cx="144016" cy="1112436"/>
           </a:xfrm>
           <a:prstGeom prst="leftBrace">
@@ -17141,14 +17116,20 @@
       </p:sp>
       <p:sp>
         <p:nvSpPr>
-          <p:cNvPr id="32" name="TextBox 31"/>
+          <p:cNvPr id="26" name="TextBox 25">
+            <a:extLst>
+              <a:ext uri="{FF2B5EF4-FFF2-40B4-BE49-F238E27FC236}">
+                <a16:creationId xmlns:a16="http://schemas.microsoft.com/office/drawing/2014/main" id="{08ACB722-A672-44A0-A8DB-C7984066C11F}"/>
+              </a:ext>
+            </a:extLst>
+          </p:cNvPr>
           <p:cNvSpPr txBox="1"/>
           <p:nvPr/>
         </p:nvSpPr>
         <p:spPr>
           <a:xfrm>
-            <a:off x="-180387" y="2817947"/>
-            <a:ext cx="2232248" cy="938719"/>
+            <a:off x="6228184" y="2803562"/>
+            <a:ext cx="2232248" cy="600164"/>
           </a:xfrm>
           <a:prstGeom prst="rect">
             <a:avLst/>
@@ -17164,31 +17145,1980 @@
             <a:pPr algn="ctr"/>
             <a:r>
               <a:rPr lang="en-AU" sz="1100" dirty="0"/>
-              <a:t>When objects with the same name appear in both schema, SQL Server defaults to </a:t>
+              <a:t>This approach is conceptually the same for all dimension types (i.e. type 1, 2 or mixed)</a:t>
+            </a:r>
+          </a:p>
+        </p:txBody>
+      </p:sp>
+      <p:sp>
+        <p:nvSpPr>
+          <p:cNvPr id="27" name="Rounded Rectangle 9">
+            <a:extLst>
+              <a:ext uri="{FF2B5EF4-FFF2-40B4-BE49-F238E27FC236}">
+                <a16:creationId xmlns:a16="http://schemas.microsoft.com/office/drawing/2014/main" id="{25F63CAF-BE92-494F-9C67-35BAB50E5399}"/>
+              </a:ext>
+            </a:extLst>
+          </p:cNvPr>
+          <p:cNvSpPr/>
+          <p:nvPr/>
+        </p:nvSpPr>
+        <p:spPr>
+          <a:xfrm>
+            <a:off x="3865017" y="2483485"/>
+            <a:ext cx="2177522" cy="576064"/>
+          </a:xfrm>
+          <a:prstGeom prst="roundRect">
+            <a:avLst/>
+          </a:prstGeom>
+          <a:solidFill>
+            <a:schemeClr val="accent1">
+              <a:lumMod val="40000"/>
+              <a:lumOff val="60000"/>
+            </a:schemeClr>
+          </a:solidFill>
+          <a:ln>
+            <a:solidFill>
+              <a:schemeClr val="accent1">
+                <a:lumMod val="20000"/>
+                <a:lumOff val="80000"/>
+              </a:schemeClr>
+            </a:solidFill>
+          </a:ln>
+        </p:spPr>
+        <p:style>
+          <a:lnRef idx="2">
+            <a:schemeClr val="accent1">
+              <a:shade val="50000"/>
+            </a:schemeClr>
+          </a:lnRef>
+          <a:fillRef idx="1">
+            <a:schemeClr val="accent1"/>
+          </a:fillRef>
+          <a:effectRef idx="0">
+            <a:schemeClr val="accent1"/>
+          </a:effectRef>
+          <a:fontRef idx="minor">
+            <a:schemeClr val="lt1"/>
+          </a:fontRef>
+        </p:style>
+        <p:txBody>
+          <a:bodyPr rtlCol="0" anchor="ctr"/>
+          <a:lstStyle/>
+          <a:p>
+            <a:pPr algn="ctr"/>
+            <a:r>
+              <a:rPr lang="en-AU" sz="1050" b="1" dirty="0">
+                <a:solidFill>
+                  <a:schemeClr val="accent1">
+                    <a:lumMod val="50000"/>
+                  </a:schemeClr>
+                </a:solidFill>
+              </a:rPr>
+              <a:t>Logic View</a:t>
             </a:r>
             <a:r>
-              <a:rPr lang="en-AU" sz="1100" dirty="0" err="1"/>
-              <a:t>dbo</a:t>
+              <a:rPr lang="en-AU" sz="1050" dirty="0">
+                <a:solidFill>
+                  <a:schemeClr val="accent1">
+                    <a:lumMod val="50000"/>
+                  </a:schemeClr>
+                </a:solidFill>
+              </a:rPr>
+              <a:t> - Logic</a:t>
             </a:r>
+          </a:p>
+          <a:p>
+            <a:pPr algn="ctr"/>
             <a:r>
-              <a:rPr lang="en-AU" sz="1100" dirty="0"/>
-              <a:t>, so it makes sense to have the exposed views available in the </a:t>
+              <a:rPr lang="en-AU" sz="1050" dirty="0">
+                <a:solidFill>
+                  <a:schemeClr val="accent1">
+                    <a:lumMod val="50000"/>
+                  </a:schemeClr>
+                </a:solidFill>
+              </a:rPr>
+              <a:t>(join and business logic)</a:t>
             </a:r>
-            <a:r>
-              <a:rPr lang="en-AU" sz="1100" dirty="0" err="1"/>
-              <a:t>dbo</a:t>
-            </a:r>
-            <a:r>
-              <a:rPr lang="en-AU" sz="1100" dirty="0"/>
-              <a:t> schema.</a:t>
-            </a:r>
           </a:p>
         </p:txBody>
       </p:sp>
+      <p:cxnSp>
+        <p:nvCxnSpPr>
+          <p:cNvPr id="28" name="Straight Connector 27">
+            <a:extLst>
+              <a:ext uri="{FF2B5EF4-FFF2-40B4-BE49-F238E27FC236}">
+                <a16:creationId xmlns:a16="http://schemas.microsoft.com/office/drawing/2014/main" id="{7B48B4A6-1F3B-4095-AA50-6A5BABD18942}"/>
+              </a:ext>
+            </a:extLst>
+          </p:cNvPr>
+          <p:cNvCxnSpPr>
+            <a:cxnSpLocks/>
+          </p:cNvCxnSpPr>
+          <p:nvPr/>
+        </p:nvCxnSpPr>
+        <p:spPr>
+          <a:xfrm flipV="1">
+            <a:off x="5868144" y="2922911"/>
+            <a:ext cx="0" cy="902345"/>
+          </a:xfrm>
+          <a:prstGeom prst="line">
+            <a:avLst/>
+          </a:prstGeom>
+          <a:ln>
+            <a:tailEnd type="arrow"/>
+          </a:ln>
+        </p:spPr>
+        <p:style>
+          <a:lnRef idx="3">
+            <a:schemeClr val="accent2"/>
+          </a:lnRef>
+          <a:fillRef idx="0">
+            <a:schemeClr val="accent2"/>
+          </a:fillRef>
+          <a:effectRef idx="2">
+            <a:schemeClr val="accent2"/>
+          </a:effectRef>
+          <a:fontRef idx="minor">
+            <a:schemeClr val="tx1"/>
+          </a:fontRef>
+        </p:style>
+      </p:cxnSp>
+      <p:cxnSp>
+        <p:nvCxnSpPr>
+          <p:cNvPr id="33" name="Straight Connector 32">
+            <a:extLst>
+              <a:ext uri="{FF2B5EF4-FFF2-40B4-BE49-F238E27FC236}">
+                <a16:creationId xmlns:a16="http://schemas.microsoft.com/office/drawing/2014/main" id="{3A8DD950-F479-4478-BFD2-669410871696}"/>
+              </a:ext>
+            </a:extLst>
+          </p:cNvPr>
+          <p:cNvCxnSpPr>
+            <a:cxnSpLocks/>
+          </p:cNvCxnSpPr>
+          <p:nvPr/>
+        </p:nvCxnSpPr>
+        <p:spPr>
+          <a:xfrm flipV="1">
+            <a:off x="5867898" y="1745557"/>
+            <a:ext cx="0" cy="902345"/>
+          </a:xfrm>
+          <a:prstGeom prst="line">
+            <a:avLst/>
+          </a:prstGeom>
+          <a:ln>
+            <a:tailEnd type="arrow"/>
+          </a:ln>
+        </p:spPr>
+        <p:style>
+          <a:lnRef idx="3">
+            <a:schemeClr val="accent2"/>
+          </a:lnRef>
+          <a:fillRef idx="0">
+            <a:schemeClr val="accent2"/>
+          </a:fillRef>
+          <a:effectRef idx="2">
+            <a:schemeClr val="accent2"/>
+          </a:effectRef>
+          <a:fontRef idx="minor">
+            <a:schemeClr val="tx1"/>
+          </a:fontRef>
+        </p:style>
+      </p:cxnSp>
     </p:spTree>
     <p:extLst>
       <p:ext uri="{BB962C8B-B14F-4D97-AF65-F5344CB8AC3E}">
-        <p14:creationId xmlns:p14="http://schemas.microsoft.com/office/powerpoint/2010/main" val="2248572585"/>
+        <p14:creationId xmlns:p14="http://schemas.microsoft.com/office/powerpoint/2010/main" val="1271550987"/>
+      </p:ext>
+    </p:extLst>
+  </p:cSld>
+  <p:clrMapOvr>
+    <a:masterClrMapping/>
+  </p:clrMapOvr>
+</p:sld>
+</file>
+
+<file path=ppt/slides/slide11.xml><?xml version="1.0" encoding="utf-8"?>
+<p:sld xmlns:a="http://schemas.openxmlformats.org/drawingml/2006/main" xmlns:r="http://schemas.openxmlformats.org/officeDocument/2006/relationships" xmlns:p="http://schemas.openxmlformats.org/presentationml/2006/main">
+  <p:cSld>
+    <p:spTree>
+      <p:nvGrpSpPr>
+        <p:cNvPr id="1" name=""/>
+        <p:cNvGrpSpPr/>
+        <p:nvPr/>
+      </p:nvGrpSpPr>
+      <p:grpSpPr>
+        <a:xfrm>
+          <a:off x="0" y="0"/>
+          <a:ext cx="0" cy="0"/>
+          <a:chOff x="0" y="0"/>
+          <a:chExt cx="0" cy="0"/>
+        </a:xfrm>
+      </p:grpSpPr>
+      <p:sp>
+        <p:nvSpPr>
+          <p:cNvPr id="4" name="Rectangle 3"/>
+          <p:cNvSpPr/>
+          <p:nvPr/>
+        </p:nvSpPr>
+        <p:spPr>
+          <a:xfrm>
+            <a:off x="1306195" y="3645024"/>
+            <a:ext cx="4926618" cy="432048"/>
+          </a:xfrm>
+          <a:prstGeom prst="rect">
+            <a:avLst/>
+          </a:prstGeom>
+        </p:spPr>
+        <p:style>
+          <a:lnRef idx="2">
+            <a:schemeClr val="accent1">
+              <a:shade val="50000"/>
+            </a:schemeClr>
+          </a:lnRef>
+          <a:fillRef idx="1">
+            <a:schemeClr val="accent1"/>
+          </a:fillRef>
+          <a:effectRef idx="0">
+            <a:schemeClr val="accent1"/>
+          </a:effectRef>
+          <a:fontRef idx="minor">
+            <a:schemeClr val="lt1"/>
+          </a:fontRef>
+        </p:style>
+        <p:txBody>
+          <a:bodyPr rtlCol="0" anchor="ctr"/>
+          <a:lstStyle/>
+          <a:p>
+            <a:pPr algn="ctr"/>
+            <a:endParaRPr lang="en-AU" sz="1200" dirty="0"/>
+          </a:p>
+        </p:txBody>
+      </p:sp>
+      <p:sp>
+        <p:nvSpPr>
+          <p:cNvPr id="5" name="Rectangle 4"/>
+          <p:cNvSpPr/>
+          <p:nvPr/>
+        </p:nvSpPr>
+        <p:spPr>
+          <a:xfrm>
+            <a:off x="1301564" y="1268002"/>
+            <a:ext cx="4926619" cy="2304255"/>
+          </a:xfrm>
+          <a:prstGeom prst="rect">
+            <a:avLst/>
+          </a:prstGeom>
+        </p:spPr>
+        <p:style>
+          <a:lnRef idx="2">
+            <a:schemeClr val="accent1">
+              <a:shade val="50000"/>
+            </a:schemeClr>
+          </a:lnRef>
+          <a:fillRef idx="1">
+            <a:schemeClr val="accent1"/>
+          </a:fillRef>
+          <a:effectRef idx="0">
+            <a:schemeClr val="accent1"/>
+          </a:effectRef>
+          <a:fontRef idx="minor">
+            <a:schemeClr val="lt1"/>
+          </a:fontRef>
+        </p:style>
+        <p:txBody>
+          <a:bodyPr rtlCol="0" anchor="ctr"/>
+          <a:lstStyle/>
+          <a:p>
+            <a:pPr algn="ctr"/>
+            <a:endParaRPr lang="en-AU" sz="1200" dirty="0"/>
+          </a:p>
+        </p:txBody>
+      </p:sp>
+      <p:sp>
+        <p:nvSpPr>
+          <p:cNvPr id="6" name="Rectangle 5"/>
+          <p:cNvSpPr/>
+          <p:nvPr/>
+        </p:nvSpPr>
+        <p:spPr>
+          <a:xfrm>
+            <a:off x="1299200" y="764704"/>
+            <a:ext cx="4926618" cy="432048"/>
+          </a:xfrm>
+          <a:prstGeom prst="rect">
+            <a:avLst/>
+          </a:prstGeom>
+          <a:solidFill>
+            <a:schemeClr val="bg1">
+              <a:lumMod val="50000"/>
+            </a:schemeClr>
+          </a:solidFill>
+        </p:spPr>
+        <p:style>
+          <a:lnRef idx="2">
+            <a:schemeClr val="accent1">
+              <a:shade val="50000"/>
+            </a:schemeClr>
+          </a:lnRef>
+          <a:fillRef idx="1">
+            <a:schemeClr val="accent1"/>
+          </a:fillRef>
+          <a:effectRef idx="0">
+            <a:schemeClr val="accent1"/>
+          </a:effectRef>
+          <a:fontRef idx="minor">
+            <a:schemeClr val="lt1"/>
+          </a:fontRef>
+        </p:style>
+        <p:txBody>
+          <a:bodyPr rtlCol="0" anchor="ctr"/>
+          <a:lstStyle/>
+          <a:p>
+            <a:pPr algn="ctr"/>
+            <a:endParaRPr lang="en-AU" sz="1200" dirty="0"/>
+          </a:p>
+        </p:txBody>
+      </p:sp>
+      <p:sp>
+        <p:nvSpPr>
+          <p:cNvPr id="8" name="Rounded Rectangle 7"/>
+          <p:cNvSpPr/>
+          <p:nvPr/>
+        </p:nvSpPr>
+        <p:spPr>
+          <a:xfrm>
+            <a:off x="1451673" y="1330390"/>
+            <a:ext cx="2177522" cy="576064"/>
+          </a:xfrm>
+          <a:prstGeom prst="roundRect">
+            <a:avLst/>
+          </a:prstGeom>
+          <a:solidFill>
+            <a:schemeClr val="accent1">
+              <a:lumMod val="40000"/>
+              <a:lumOff val="60000"/>
+            </a:schemeClr>
+          </a:solidFill>
+          <a:ln>
+            <a:solidFill>
+              <a:schemeClr val="accent1">
+                <a:lumMod val="20000"/>
+                <a:lumOff val="80000"/>
+              </a:schemeClr>
+            </a:solidFill>
+          </a:ln>
+        </p:spPr>
+        <p:style>
+          <a:lnRef idx="2">
+            <a:schemeClr val="accent1">
+              <a:shade val="50000"/>
+            </a:schemeClr>
+          </a:lnRef>
+          <a:fillRef idx="1">
+            <a:schemeClr val="accent1"/>
+          </a:fillRef>
+          <a:effectRef idx="0">
+            <a:schemeClr val="accent1"/>
+          </a:effectRef>
+          <a:fontRef idx="minor">
+            <a:schemeClr val="lt1"/>
+          </a:fontRef>
+        </p:style>
+        <p:txBody>
+          <a:bodyPr rtlCol="0" anchor="ctr"/>
+          <a:lstStyle/>
+          <a:p>
+            <a:pPr algn="ctr"/>
+            <a:r>
+              <a:rPr lang="en-AU" sz="1050" b="1" dirty="0">
+                <a:solidFill>
+                  <a:schemeClr val="accent1">
+                    <a:lumMod val="50000"/>
+                  </a:schemeClr>
+                </a:solidFill>
+              </a:rPr>
+              <a:t>Decoupling View</a:t>
+            </a:r>
+          </a:p>
+          <a:p>
+            <a:pPr algn="ctr"/>
+            <a:r>
+              <a:rPr lang="en-AU" sz="1050" dirty="0" err="1">
+                <a:solidFill>
+                  <a:schemeClr val="accent1">
+                    <a:lumMod val="50000"/>
+                  </a:schemeClr>
+                </a:solidFill>
+              </a:rPr>
+              <a:t>pres.dim</a:t>
+            </a:r>
+            <a:r>
+              <a:rPr lang="en-AU" sz="1050" dirty="0">
+                <a:solidFill>
+                  <a:schemeClr val="accent1">
+                    <a:lumMod val="50000"/>
+                  </a:schemeClr>
+                </a:solidFill>
+              </a:rPr>
+              <a:t>_&lt;table&gt;</a:t>
+            </a:r>
+          </a:p>
+        </p:txBody>
+      </p:sp>
+      <p:sp>
+        <p:nvSpPr>
+          <p:cNvPr id="9" name="Rounded Rectangle 8"/>
+          <p:cNvSpPr/>
+          <p:nvPr/>
+        </p:nvSpPr>
+        <p:spPr>
+          <a:xfrm>
+            <a:off x="1451673" y="1908698"/>
+            <a:ext cx="2177522" cy="576064"/>
+          </a:xfrm>
+          <a:prstGeom prst="roundRect">
+            <a:avLst/>
+          </a:prstGeom>
+          <a:solidFill>
+            <a:schemeClr val="accent1">
+              <a:lumMod val="40000"/>
+              <a:lumOff val="60000"/>
+            </a:schemeClr>
+          </a:solidFill>
+          <a:ln>
+            <a:solidFill>
+              <a:schemeClr val="accent1">
+                <a:lumMod val="20000"/>
+                <a:lumOff val="80000"/>
+              </a:schemeClr>
+            </a:solidFill>
+          </a:ln>
+        </p:spPr>
+        <p:style>
+          <a:lnRef idx="2">
+            <a:schemeClr val="accent1">
+              <a:shade val="50000"/>
+            </a:schemeClr>
+          </a:lnRef>
+          <a:fillRef idx="1">
+            <a:schemeClr val="accent1"/>
+          </a:fillRef>
+          <a:effectRef idx="0">
+            <a:schemeClr val="accent1"/>
+          </a:effectRef>
+          <a:fontRef idx="minor">
+            <a:schemeClr val="lt1"/>
+          </a:fontRef>
+        </p:style>
+        <p:txBody>
+          <a:bodyPr rtlCol="0" anchor="ctr"/>
+          <a:lstStyle/>
+          <a:p>
+            <a:pPr algn="ctr"/>
+            <a:r>
+              <a:rPr lang="en-AU" sz="1050" b="1" dirty="0">
+                <a:solidFill>
+                  <a:schemeClr val="accent1">
+                    <a:lumMod val="50000"/>
+                  </a:schemeClr>
+                </a:solidFill>
+              </a:rPr>
+              <a:t>Table</a:t>
+            </a:r>
+          </a:p>
+          <a:p>
+            <a:pPr algn="ctr">
+              <a:tabLst>
+                <a:tab pos="82550" algn="l"/>
+              </a:tabLst>
+            </a:pPr>
+            <a:r>
+              <a:rPr lang="en-AU" sz="1050" dirty="0" err="1">
+                <a:solidFill>
+                  <a:schemeClr val="accent1">
+                    <a:lumMod val="50000"/>
+                  </a:schemeClr>
+                </a:solidFill>
+              </a:rPr>
+              <a:t>ben.dim</a:t>
+            </a:r>
+            <a:r>
+              <a:rPr lang="en-AU" sz="1050" dirty="0">
+                <a:solidFill>
+                  <a:schemeClr val="accent1">
+                    <a:lumMod val="50000"/>
+                  </a:schemeClr>
+                </a:solidFill>
+              </a:rPr>
+              <a:t>_&lt;table&gt;_TBL</a:t>
+            </a:r>
+          </a:p>
+        </p:txBody>
+      </p:sp>
+      <p:sp>
+        <p:nvSpPr>
+          <p:cNvPr id="10" name="Rounded Rectangle 9"/>
+          <p:cNvSpPr/>
+          <p:nvPr/>
+        </p:nvSpPr>
+        <p:spPr>
+          <a:xfrm>
+            <a:off x="1451673" y="2484762"/>
+            <a:ext cx="2177522" cy="576064"/>
+          </a:xfrm>
+          <a:prstGeom prst="roundRect">
+            <a:avLst/>
+          </a:prstGeom>
+          <a:solidFill>
+            <a:schemeClr val="accent1">
+              <a:lumMod val="40000"/>
+              <a:lumOff val="60000"/>
+            </a:schemeClr>
+          </a:solidFill>
+          <a:ln>
+            <a:solidFill>
+              <a:schemeClr val="accent1">
+                <a:lumMod val="20000"/>
+                <a:lumOff val="80000"/>
+              </a:schemeClr>
+            </a:solidFill>
+          </a:ln>
+        </p:spPr>
+        <p:style>
+          <a:lnRef idx="2">
+            <a:schemeClr val="accent1">
+              <a:shade val="50000"/>
+            </a:schemeClr>
+          </a:lnRef>
+          <a:fillRef idx="1">
+            <a:schemeClr val="accent1"/>
+          </a:fillRef>
+          <a:effectRef idx="0">
+            <a:schemeClr val="accent1"/>
+          </a:effectRef>
+          <a:fontRef idx="minor">
+            <a:schemeClr val="lt1"/>
+          </a:fontRef>
+        </p:style>
+        <p:txBody>
+          <a:bodyPr rtlCol="0" anchor="ctr"/>
+          <a:lstStyle/>
+          <a:p>
+            <a:pPr algn="ctr"/>
+            <a:r>
+              <a:rPr lang="en-AU" sz="1050" b="1" dirty="0">
+                <a:solidFill>
+                  <a:schemeClr val="accent1">
+                    <a:lumMod val="50000"/>
+                  </a:schemeClr>
+                </a:solidFill>
+              </a:rPr>
+              <a:t>Logic View</a:t>
+            </a:r>
+            <a:endParaRPr lang="en-AU" sz="1050" dirty="0">
+              <a:solidFill>
+                <a:schemeClr val="accent1">
+                  <a:lumMod val="50000"/>
+                </a:schemeClr>
+              </a:solidFill>
+            </a:endParaRPr>
+          </a:p>
+          <a:p>
+            <a:pPr algn="ctr"/>
+            <a:r>
+              <a:rPr lang="en-AU" sz="1050" dirty="0" err="1">
+                <a:solidFill>
+                  <a:schemeClr val="accent1">
+                    <a:lumMod val="50000"/>
+                  </a:schemeClr>
+                </a:solidFill>
+              </a:rPr>
+              <a:t>ben.dim</a:t>
+            </a:r>
+            <a:r>
+              <a:rPr lang="en-AU" sz="1050" dirty="0">
+                <a:solidFill>
+                  <a:schemeClr val="accent1">
+                    <a:lumMod val="50000"/>
+                  </a:schemeClr>
+                </a:solidFill>
+              </a:rPr>
+              <a:t>_&lt;table&gt;_VW</a:t>
+            </a:r>
+          </a:p>
+        </p:txBody>
+      </p:sp>
+      <p:sp>
+        <p:nvSpPr>
+          <p:cNvPr id="11" name="TextBox 10"/>
+          <p:cNvSpPr txBox="1"/>
+          <p:nvPr/>
+        </p:nvSpPr>
+        <p:spPr>
+          <a:xfrm>
+            <a:off x="2826405" y="3243137"/>
+            <a:ext cx="1872208" cy="307777"/>
+          </a:xfrm>
+          <a:prstGeom prst="rect">
+            <a:avLst/>
+          </a:prstGeom>
+          <a:noFill/>
+        </p:spPr>
+        <p:txBody>
+          <a:bodyPr wrap="square" rtlCol="0">
+            <a:spAutoFit/>
+          </a:bodyPr>
+          <a:lstStyle/>
+          <a:p>
+            <a:pPr algn="ctr"/>
+            <a:r>
+              <a:rPr lang="en-AU" sz="1400" dirty="0">
+                <a:solidFill>
+                  <a:schemeClr val="bg1"/>
+                </a:solidFill>
+              </a:rPr>
+              <a:t>Presentation Layer</a:t>
+            </a:r>
+          </a:p>
+        </p:txBody>
+      </p:sp>
+      <p:sp>
+        <p:nvSpPr>
+          <p:cNvPr id="12" name="TextBox 11"/>
+          <p:cNvSpPr txBox="1"/>
+          <p:nvPr/>
+        </p:nvSpPr>
+        <p:spPr>
+          <a:xfrm>
+            <a:off x="2833400" y="3719132"/>
+            <a:ext cx="1872208" cy="307777"/>
+          </a:xfrm>
+          <a:prstGeom prst="rect">
+            <a:avLst/>
+          </a:prstGeom>
+          <a:noFill/>
+        </p:spPr>
+        <p:txBody>
+          <a:bodyPr wrap="square" rtlCol="0">
+            <a:spAutoFit/>
+          </a:bodyPr>
+          <a:lstStyle/>
+          <a:p>
+            <a:pPr algn="ctr"/>
+            <a:r>
+              <a:rPr lang="en-AU" sz="1400" dirty="0">
+                <a:solidFill>
+                  <a:schemeClr val="bg1"/>
+                </a:solidFill>
+              </a:rPr>
+              <a:t>Integration Layer</a:t>
+            </a:r>
+          </a:p>
+        </p:txBody>
+      </p:sp>
+      <p:sp>
+        <p:nvSpPr>
+          <p:cNvPr id="13" name="TextBox 12"/>
+          <p:cNvSpPr txBox="1"/>
+          <p:nvPr/>
+        </p:nvSpPr>
+        <p:spPr>
+          <a:xfrm>
+            <a:off x="2826405" y="826081"/>
+            <a:ext cx="1872208" cy="307777"/>
+          </a:xfrm>
+          <a:prstGeom prst="rect">
+            <a:avLst/>
+          </a:prstGeom>
+          <a:noFill/>
+        </p:spPr>
+        <p:txBody>
+          <a:bodyPr wrap="square" rtlCol="0">
+            <a:spAutoFit/>
+          </a:bodyPr>
+          <a:lstStyle/>
+          <a:p>
+            <a:pPr algn="ctr"/>
+            <a:r>
+              <a:rPr lang="en-AU" sz="1400" dirty="0">
+                <a:solidFill>
+                  <a:schemeClr val="bg1"/>
+                </a:solidFill>
+              </a:rPr>
+              <a:t>Business Intelligence</a:t>
+            </a:r>
+          </a:p>
+        </p:txBody>
+      </p:sp>
+      <p:cxnSp>
+        <p:nvCxnSpPr>
+          <p:cNvPr id="16" name="Straight Connector 15"/>
+          <p:cNvCxnSpPr/>
+          <p:nvPr/>
+        </p:nvCxnSpPr>
+        <p:spPr>
+          <a:xfrm flipV="1">
+            <a:off x="1687495" y="2301174"/>
+            <a:ext cx="0" cy="367175"/>
+          </a:xfrm>
+          <a:prstGeom prst="line">
+            <a:avLst/>
+          </a:prstGeom>
+          <a:ln>
+            <a:tailEnd type="arrow"/>
+          </a:ln>
+        </p:spPr>
+        <p:style>
+          <a:lnRef idx="3">
+            <a:schemeClr val="accent2"/>
+          </a:lnRef>
+          <a:fillRef idx="0">
+            <a:schemeClr val="accent2"/>
+          </a:fillRef>
+          <a:effectRef idx="2">
+            <a:schemeClr val="accent2"/>
+          </a:effectRef>
+          <a:fontRef idx="minor">
+            <a:schemeClr val="tx1"/>
+          </a:fontRef>
+        </p:style>
+      </p:cxnSp>
+      <p:sp>
+        <p:nvSpPr>
+          <p:cNvPr id="24" name="TextBox 23"/>
+          <p:cNvSpPr txBox="1"/>
+          <p:nvPr/>
+        </p:nvSpPr>
+        <p:spPr>
+          <a:xfrm>
+            <a:off x="11654" y="1516283"/>
+            <a:ext cx="1240888" cy="261610"/>
+          </a:xfrm>
+          <a:prstGeom prst="rect">
+            <a:avLst/>
+          </a:prstGeom>
+          <a:noFill/>
+        </p:spPr>
+        <p:txBody>
+          <a:bodyPr wrap="square" rtlCol="0">
+            <a:spAutoFit/>
+          </a:bodyPr>
+          <a:lstStyle/>
+          <a:p>
+            <a:pPr algn="ctr"/>
+            <a:r>
+              <a:rPr lang="en-AU" sz="1100" b="1" dirty="0" err="1"/>
+              <a:t>pres</a:t>
+            </a:r>
+            <a:r>
+              <a:rPr lang="en-AU" sz="1100" b="1" dirty="0"/>
+              <a:t> schema</a:t>
+            </a:r>
+          </a:p>
+        </p:txBody>
+      </p:sp>
+      <p:sp>
+        <p:nvSpPr>
+          <p:cNvPr id="25" name="TextBox 24"/>
+          <p:cNvSpPr txBox="1"/>
+          <p:nvPr/>
+        </p:nvSpPr>
+        <p:spPr>
+          <a:xfrm>
+            <a:off x="15825" y="2373803"/>
+            <a:ext cx="1240888" cy="261610"/>
+          </a:xfrm>
+          <a:prstGeom prst="rect">
+            <a:avLst/>
+          </a:prstGeom>
+          <a:noFill/>
+        </p:spPr>
+        <p:txBody>
+          <a:bodyPr wrap="square" rtlCol="0">
+            <a:spAutoFit/>
+          </a:bodyPr>
+          <a:lstStyle/>
+          <a:p>
+            <a:pPr algn="ctr"/>
+            <a:r>
+              <a:rPr lang="en-AU" sz="1100" b="1" dirty="0"/>
+              <a:t>ben schema</a:t>
+            </a:r>
+          </a:p>
+        </p:txBody>
+      </p:sp>
+      <p:cxnSp>
+        <p:nvCxnSpPr>
+          <p:cNvPr id="15" name="Straight Connector 14"/>
+          <p:cNvCxnSpPr>
+            <a:cxnSpLocks/>
+          </p:cNvCxnSpPr>
+          <p:nvPr/>
+        </p:nvCxnSpPr>
+        <p:spPr>
+          <a:xfrm flipV="1">
+            <a:off x="1687495" y="2924188"/>
+            <a:ext cx="0" cy="901068"/>
+          </a:xfrm>
+          <a:prstGeom prst="line">
+            <a:avLst/>
+          </a:prstGeom>
+          <a:ln>
+            <a:tailEnd type="arrow"/>
+          </a:ln>
+        </p:spPr>
+        <p:style>
+          <a:lnRef idx="3">
+            <a:schemeClr val="accent2"/>
+          </a:lnRef>
+          <a:fillRef idx="0">
+            <a:schemeClr val="accent2"/>
+          </a:fillRef>
+          <a:effectRef idx="2">
+            <a:schemeClr val="accent2"/>
+          </a:effectRef>
+          <a:fontRef idx="minor">
+            <a:schemeClr val="tx1"/>
+          </a:fontRef>
+        </p:style>
+      </p:cxnSp>
+      <p:cxnSp>
+        <p:nvCxnSpPr>
+          <p:cNvPr id="17" name="Straight Connector 16"/>
+          <p:cNvCxnSpPr/>
+          <p:nvPr/>
+        </p:nvCxnSpPr>
+        <p:spPr>
+          <a:xfrm flipV="1">
+            <a:off x="1687495" y="1725110"/>
+            <a:ext cx="0" cy="367175"/>
+          </a:xfrm>
+          <a:prstGeom prst="line">
+            <a:avLst/>
+          </a:prstGeom>
+          <a:ln>
+            <a:tailEnd type="arrow"/>
+          </a:ln>
+        </p:spPr>
+        <p:style>
+          <a:lnRef idx="3">
+            <a:schemeClr val="accent2"/>
+          </a:lnRef>
+          <a:fillRef idx="0">
+            <a:schemeClr val="accent2"/>
+          </a:fillRef>
+          <a:effectRef idx="2">
+            <a:schemeClr val="accent2"/>
+          </a:effectRef>
+          <a:fontRef idx="minor">
+            <a:schemeClr val="tx1"/>
+          </a:fontRef>
+        </p:style>
+      </p:cxnSp>
+      <p:sp>
+        <p:nvSpPr>
+          <p:cNvPr id="30" name="Left Brace 29"/>
+          <p:cNvSpPr/>
+          <p:nvPr/>
+        </p:nvSpPr>
+        <p:spPr>
+          <a:xfrm>
+            <a:off x="1085541" y="1412018"/>
+            <a:ext cx="144016" cy="496680"/>
+          </a:xfrm>
+          <a:prstGeom prst="leftBrace">
+            <a:avLst/>
+          </a:prstGeom>
+        </p:spPr>
+        <p:style>
+          <a:lnRef idx="1">
+            <a:schemeClr val="accent1"/>
+          </a:lnRef>
+          <a:fillRef idx="0">
+            <a:schemeClr val="accent1"/>
+          </a:fillRef>
+          <a:effectRef idx="0">
+            <a:schemeClr val="accent1"/>
+          </a:effectRef>
+          <a:fontRef idx="minor">
+            <a:schemeClr val="tx1"/>
+          </a:fontRef>
+        </p:style>
+        <p:txBody>
+          <a:bodyPr rtlCol="0" anchor="ctr"/>
+          <a:lstStyle/>
+          <a:p>
+            <a:pPr algn="ctr"/>
+            <a:endParaRPr lang="en-AU"/>
+          </a:p>
+        </p:txBody>
+      </p:sp>
+      <p:sp>
+        <p:nvSpPr>
+          <p:cNvPr id="31" name="Left Brace 30"/>
+          <p:cNvSpPr/>
+          <p:nvPr/>
+        </p:nvSpPr>
+        <p:spPr>
+          <a:xfrm>
+            <a:off x="1085541" y="1948390"/>
+            <a:ext cx="144016" cy="1112436"/>
+          </a:xfrm>
+          <a:prstGeom prst="leftBrace">
+            <a:avLst/>
+          </a:prstGeom>
+        </p:spPr>
+        <p:style>
+          <a:lnRef idx="1">
+            <a:schemeClr val="accent1"/>
+          </a:lnRef>
+          <a:fillRef idx="0">
+            <a:schemeClr val="accent1"/>
+          </a:fillRef>
+          <a:effectRef idx="0">
+            <a:schemeClr val="accent1"/>
+          </a:effectRef>
+          <a:fontRef idx="minor">
+            <a:schemeClr val="tx1"/>
+          </a:fontRef>
+        </p:style>
+        <p:txBody>
+          <a:bodyPr rtlCol="0" anchor="ctr"/>
+          <a:lstStyle/>
+          <a:p>
+            <a:pPr algn="ctr"/>
+            <a:endParaRPr lang="en-AU"/>
+          </a:p>
+        </p:txBody>
+      </p:sp>
+      <p:sp>
+        <p:nvSpPr>
+          <p:cNvPr id="34" name="TextBox 33">
+            <a:extLst>
+              <a:ext uri="{FF2B5EF4-FFF2-40B4-BE49-F238E27FC236}">
+                <a16:creationId xmlns:a16="http://schemas.microsoft.com/office/drawing/2014/main" id="{DC045134-85DD-4206-8FE6-3B8F7011A038}"/>
+              </a:ext>
+            </a:extLst>
+          </p:cNvPr>
+          <p:cNvSpPr txBox="1"/>
+          <p:nvPr/>
+        </p:nvSpPr>
+        <p:spPr>
+          <a:xfrm>
+            <a:off x="4012102" y="2066965"/>
+            <a:ext cx="1765957" cy="830997"/>
+          </a:xfrm>
+          <a:prstGeom prst="rect">
+            <a:avLst/>
+          </a:prstGeom>
+          <a:noFill/>
+        </p:spPr>
+        <p:txBody>
+          <a:bodyPr wrap="square" rtlCol="0">
+            <a:spAutoFit/>
+          </a:bodyPr>
+          <a:lstStyle/>
+          <a:p>
+            <a:pPr algn="ctr"/>
+            <a:r>
+              <a:rPr lang="en-AU" sz="1600" dirty="0"/>
+              <a:t>Type 1 example</a:t>
+            </a:r>
+          </a:p>
+          <a:p>
+            <a:pPr algn="ctr"/>
+            <a:r>
+              <a:rPr lang="en-AU" sz="1600" dirty="0"/>
+              <a:t>(with table added for materialisation)</a:t>
+            </a:r>
+          </a:p>
+        </p:txBody>
+      </p:sp>
+      <p:sp>
+        <p:nvSpPr>
+          <p:cNvPr id="35" name="TextBox 34">
+            <a:extLst>
+              <a:ext uri="{FF2B5EF4-FFF2-40B4-BE49-F238E27FC236}">
+                <a16:creationId xmlns:a16="http://schemas.microsoft.com/office/drawing/2014/main" id="{C831BB2F-B8C2-4902-B214-F31C42C6E183}"/>
+              </a:ext>
+            </a:extLst>
+          </p:cNvPr>
+          <p:cNvSpPr txBox="1"/>
+          <p:nvPr/>
+        </p:nvSpPr>
+        <p:spPr>
+          <a:xfrm>
+            <a:off x="6225818" y="1322844"/>
+            <a:ext cx="2010132" cy="1446550"/>
+          </a:xfrm>
+          <a:prstGeom prst="rect">
+            <a:avLst/>
+          </a:prstGeom>
+          <a:noFill/>
+        </p:spPr>
+        <p:txBody>
+          <a:bodyPr wrap="square" rtlCol="0">
+            <a:spAutoFit/>
+          </a:bodyPr>
+          <a:lstStyle/>
+          <a:p>
+            <a:pPr algn="ctr"/>
+            <a:r>
+              <a:rPr lang="en-AU" sz="1100" dirty="0"/>
+              <a:t>Type 1 dimensions are considered the ‘standard’ and expected to be able to support the majority of the questions.</a:t>
+            </a:r>
+          </a:p>
+          <a:p>
+            <a:pPr algn="ctr"/>
+            <a:endParaRPr lang="en-AU" sz="1100" dirty="0"/>
+          </a:p>
+          <a:p>
+            <a:pPr algn="ctr"/>
+            <a:r>
+              <a:rPr lang="en-AU" sz="1100" dirty="0"/>
+              <a:t>Therefore, these do not have any suffixes in the name of the views and tables</a:t>
+            </a:r>
+          </a:p>
+        </p:txBody>
+      </p:sp>
+    </p:spTree>
+    <p:extLst>
+      <p:ext uri="{BB962C8B-B14F-4D97-AF65-F5344CB8AC3E}">
+        <p14:creationId xmlns:p14="http://schemas.microsoft.com/office/powerpoint/2010/main" val="1144161031"/>
+      </p:ext>
+    </p:extLst>
+  </p:cSld>
+  <p:clrMapOvr>
+    <a:masterClrMapping/>
+  </p:clrMapOvr>
+</p:sld>
+</file>
+
+<file path=ppt/slides/slide12.xml><?xml version="1.0" encoding="utf-8"?>
+<p:sld xmlns:a="http://schemas.openxmlformats.org/drawingml/2006/main" xmlns:r="http://schemas.openxmlformats.org/officeDocument/2006/relationships" xmlns:p="http://schemas.openxmlformats.org/presentationml/2006/main">
+  <p:cSld>
+    <p:spTree>
+      <p:nvGrpSpPr>
+        <p:cNvPr id="1" name=""/>
+        <p:cNvGrpSpPr/>
+        <p:nvPr/>
+      </p:nvGrpSpPr>
+      <p:grpSpPr>
+        <a:xfrm>
+          <a:off x="0" y="0"/>
+          <a:ext cx="0" cy="0"/>
+          <a:chOff x="0" y="0"/>
+          <a:chExt cx="0" cy="0"/>
+        </a:xfrm>
+      </p:grpSpPr>
+      <p:sp>
+        <p:nvSpPr>
+          <p:cNvPr id="4" name="Rectangle 3"/>
+          <p:cNvSpPr/>
+          <p:nvPr/>
+        </p:nvSpPr>
+        <p:spPr>
+          <a:xfrm>
+            <a:off x="1306195" y="3645024"/>
+            <a:ext cx="4926618" cy="432048"/>
+          </a:xfrm>
+          <a:prstGeom prst="rect">
+            <a:avLst/>
+          </a:prstGeom>
+        </p:spPr>
+        <p:style>
+          <a:lnRef idx="2">
+            <a:schemeClr val="accent1">
+              <a:shade val="50000"/>
+            </a:schemeClr>
+          </a:lnRef>
+          <a:fillRef idx="1">
+            <a:schemeClr val="accent1"/>
+          </a:fillRef>
+          <a:effectRef idx="0">
+            <a:schemeClr val="accent1"/>
+          </a:effectRef>
+          <a:fontRef idx="minor">
+            <a:schemeClr val="lt1"/>
+          </a:fontRef>
+        </p:style>
+        <p:txBody>
+          <a:bodyPr rtlCol="0" anchor="ctr"/>
+          <a:lstStyle/>
+          <a:p>
+            <a:pPr algn="ctr"/>
+            <a:endParaRPr lang="en-AU" sz="1200" dirty="0"/>
+          </a:p>
+        </p:txBody>
+      </p:sp>
+      <p:sp>
+        <p:nvSpPr>
+          <p:cNvPr id="5" name="Rectangle 4"/>
+          <p:cNvSpPr/>
+          <p:nvPr/>
+        </p:nvSpPr>
+        <p:spPr>
+          <a:xfrm>
+            <a:off x="1301564" y="1268002"/>
+            <a:ext cx="4926619" cy="2304255"/>
+          </a:xfrm>
+          <a:prstGeom prst="rect">
+            <a:avLst/>
+          </a:prstGeom>
+        </p:spPr>
+        <p:style>
+          <a:lnRef idx="2">
+            <a:schemeClr val="accent1">
+              <a:shade val="50000"/>
+            </a:schemeClr>
+          </a:lnRef>
+          <a:fillRef idx="1">
+            <a:schemeClr val="accent1"/>
+          </a:fillRef>
+          <a:effectRef idx="0">
+            <a:schemeClr val="accent1"/>
+          </a:effectRef>
+          <a:fontRef idx="minor">
+            <a:schemeClr val="lt1"/>
+          </a:fontRef>
+        </p:style>
+        <p:txBody>
+          <a:bodyPr rtlCol="0" anchor="ctr"/>
+          <a:lstStyle/>
+          <a:p>
+            <a:pPr algn="ctr"/>
+            <a:endParaRPr lang="en-AU" sz="1200" dirty="0"/>
+          </a:p>
+        </p:txBody>
+      </p:sp>
+      <p:sp>
+        <p:nvSpPr>
+          <p:cNvPr id="6" name="Rectangle 5"/>
+          <p:cNvSpPr/>
+          <p:nvPr/>
+        </p:nvSpPr>
+        <p:spPr>
+          <a:xfrm>
+            <a:off x="1299200" y="764704"/>
+            <a:ext cx="4926618" cy="432048"/>
+          </a:xfrm>
+          <a:prstGeom prst="rect">
+            <a:avLst/>
+          </a:prstGeom>
+          <a:solidFill>
+            <a:schemeClr val="bg1">
+              <a:lumMod val="50000"/>
+            </a:schemeClr>
+          </a:solidFill>
+        </p:spPr>
+        <p:style>
+          <a:lnRef idx="2">
+            <a:schemeClr val="accent1">
+              <a:shade val="50000"/>
+            </a:schemeClr>
+          </a:lnRef>
+          <a:fillRef idx="1">
+            <a:schemeClr val="accent1"/>
+          </a:fillRef>
+          <a:effectRef idx="0">
+            <a:schemeClr val="accent1"/>
+          </a:effectRef>
+          <a:fontRef idx="minor">
+            <a:schemeClr val="lt1"/>
+          </a:fontRef>
+        </p:style>
+        <p:txBody>
+          <a:bodyPr rtlCol="0" anchor="ctr"/>
+          <a:lstStyle/>
+          <a:p>
+            <a:pPr algn="ctr"/>
+            <a:endParaRPr lang="en-AU" sz="1200" dirty="0"/>
+          </a:p>
+        </p:txBody>
+      </p:sp>
+      <p:sp>
+        <p:nvSpPr>
+          <p:cNvPr id="8" name="Rounded Rectangle 7"/>
+          <p:cNvSpPr/>
+          <p:nvPr/>
+        </p:nvSpPr>
+        <p:spPr>
+          <a:xfrm>
+            <a:off x="1451673" y="1330390"/>
+            <a:ext cx="2177522" cy="576064"/>
+          </a:xfrm>
+          <a:prstGeom prst="roundRect">
+            <a:avLst/>
+          </a:prstGeom>
+          <a:solidFill>
+            <a:schemeClr val="accent1">
+              <a:lumMod val="40000"/>
+              <a:lumOff val="60000"/>
+            </a:schemeClr>
+          </a:solidFill>
+          <a:ln>
+            <a:solidFill>
+              <a:schemeClr val="accent1">
+                <a:lumMod val="20000"/>
+                <a:lumOff val="80000"/>
+              </a:schemeClr>
+            </a:solidFill>
+          </a:ln>
+        </p:spPr>
+        <p:style>
+          <a:lnRef idx="2">
+            <a:schemeClr val="accent1">
+              <a:shade val="50000"/>
+            </a:schemeClr>
+          </a:lnRef>
+          <a:fillRef idx="1">
+            <a:schemeClr val="accent1"/>
+          </a:fillRef>
+          <a:effectRef idx="0">
+            <a:schemeClr val="accent1"/>
+          </a:effectRef>
+          <a:fontRef idx="minor">
+            <a:schemeClr val="lt1"/>
+          </a:fontRef>
+        </p:style>
+        <p:txBody>
+          <a:bodyPr rtlCol="0" anchor="ctr"/>
+          <a:lstStyle/>
+          <a:p>
+            <a:pPr algn="ctr"/>
+            <a:r>
+              <a:rPr lang="en-AU" sz="1050" b="1" dirty="0">
+                <a:solidFill>
+                  <a:schemeClr val="accent1">
+                    <a:lumMod val="50000"/>
+                  </a:schemeClr>
+                </a:solidFill>
+              </a:rPr>
+              <a:t>Decoupling View</a:t>
+            </a:r>
+          </a:p>
+          <a:p>
+            <a:pPr algn="ctr"/>
+            <a:r>
+              <a:rPr lang="en-AU" sz="1050" dirty="0" err="1">
+                <a:solidFill>
+                  <a:schemeClr val="accent1">
+                    <a:lumMod val="50000"/>
+                  </a:schemeClr>
+                </a:solidFill>
+              </a:rPr>
+              <a:t>pres.dim</a:t>
+            </a:r>
+            <a:r>
+              <a:rPr lang="en-AU" sz="1050" dirty="0">
+                <a:solidFill>
+                  <a:schemeClr val="accent1">
+                    <a:lumMod val="50000"/>
+                  </a:schemeClr>
+                </a:solidFill>
+              </a:rPr>
+              <a:t>_&lt;table&gt;</a:t>
+            </a:r>
+            <a:r>
+              <a:rPr lang="en-AU" sz="1050" b="1" dirty="0">
+                <a:solidFill>
+                  <a:schemeClr val="accent1">
+                    <a:lumMod val="50000"/>
+                  </a:schemeClr>
+                </a:solidFill>
+              </a:rPr>
+              <a:t>_Pit</a:t>
+            </a:r>
+          </a:p>
+        </p:txBody>
+      </p:sp>
+      <p:sp>
+        <p:nvSpPr>
+          <p:cNvPr id="9" name="Rounded Rectangle 8"/>
+          <p:cNvSpPr/>
+          <p:nvPr/>
+        </p:nvSpPr>
+        <p:spPr>
+          <a:xfrm>
+            <a:off x="1451673" y="1908698"/>
+            <a:ext cx="2177522" cy="576064"/>
+          </a:xfrm>
+          <a:prstGeom prst="roundRect">
+            <a:avLst/>
+          </a:prstGeom>
+          <a:solidFill>
+            <a:schemeClr val="accent1">
+              <a:lumMod val="40000"/>
+              <a:lumOff val="60000"/>
+            </a:schemeClr>
+          </a:solidFill>
+          <a:ln>
+            <a:solidFill>
+              <a:schemeClr val="accent1">
+                <a:lumMod val="20000"/>
+                <a:lumOff val="80000"/>
+              </a:schemeClr>
+            </a:solidFill>
+          </a:ln>
+        </p:spPr>
+        <p:style>
+          <a:lnRef idx="2">
+            <a:schemeClr val="accent1">
+              <a:shade val="50000"/>
+            </a:schemeClr>
+          </a:lnRef>
+          <a:fillRef idx="1">
+            <a:schemeClr val="accent1"/>
+          </a:fillRef>
+          <a:effectRef idx="0">
+            <a:schemeClr val="accent1"/>
+          </a:effectRef>
+          <a:fontRef idx="minor">
+            <a:schemeClr val="lt1"/>
+          </a:fontRef>
+        </p:style>
+        <p:txBody>
+          <a:bodyPr rtlCol="0" anchor="ctr"/>
+          <a:lstStyle/>
+          <a:p>
+            <a:pPr algn="ctr"/>
+            <a:r>
+              <a:rPr lang="en-AU" sz="1050" b="1" dirty="0">
+                <a:solidFill>
+                  <a:schemeClr val="accent1">
+                    <a:lumMod val="50000"/>
+                  </a:schemeClr>
+                </a:solidFill>
+              </a:rPr>
+              <a:t>Table</a:t>
+            </a:r>
+          </a:p>
+          <a:p>
+            <a:pPr algn="ctr">
+              <a:tabLst>
+                <a:tab pos="82550" algn="l"/>
+              </a:tabLst>
+            </a:pPr>
+            <a:r>
+              <a:rPr lang="en-AU" sz="1050" dirty="0" err="1">
+                <a:solidFill>
+                  <a:schemeClr val="accent1">
+                    <a:lumMod val="50000"/>
+                  </a:schemeClr>
+                </a:solidFill>
+              </a:rPr>
+              <a:t>ben.dim</a:t>
+            </a:r>
+            <a:r>
+              <a:rPr lang="en-AU" sz="1050" dirty="0">
+                <a:solidFill>
+                  <a:schemeClr val="accent1">
+                    <a:lumMod val="50000"/>
+                  </a:schemeClr>
+                </a:solidFill>
+              </a:rPr>
+              <a:t>_&lt;table&gt;</a:t>
+            </a:r>
+            <a:r>
+              <a:rPr lang="en-AU" sz="1050" b="1" dirty="0">
+                <a:solidFill>
+                  <a:schemeClr val="accent1">
+                    <a:lumMod val="50000"/>
+                  </a:schemeClr>
+                </a:solidFill>
+              </a:rPr>
+              <a:t>_</a:t>
+            </a:r>
+            <a:r>
+              <a:rPr lang="en-AU" sz="1050" b="1" dirty="0" err="1">
+                <a:solidFill>
+                  <a:schemeClr val="accent1">
+                    <a:lumMod val="50000"/>
+                  </a:schemeClr>
+                </a:solidFill>
+              </a:rPr>
+              <a:t>Pit</a:t>
+            </a:r>
+            <a:r>
+              <a:rPr lang="en-AU" sz="1050" dirty="0" err="1">
+                <a:solidFill>
+                  <a:schemeClr val="accent1">
+                    <a:lumMod val="50000"/>
+                  </a:schemeClr>
+                </a:solidFill>
+              </a:rPr>
+              <a:t>_TBL</a:t>
+            </a:r>
+            <a:endParaRPr lang="en-AU" sz="1050" dirty="0">
+              <a:solidFill>
+                <a:schemeClr val="accent1">
+                  <a:lumMod val="50000"/>
+                </a:schemeClr>
+              </a:solidFill>
+            </a:endParaRPr>
+          </a:p>
+        </p:txBody>
+      </p:sp>
+      <p:sp>
+        <p:nvSpPr>
+          <p:cNvPr id="10" name="Rounded Rectangle 9"/>
+          <p:cNvSpPr/>
+          <p:nvPr/>
+        </p:nvSpPr>
+        <p:spPr>
+          <a:xfrm>
+            <a:off x="1451673" y="2484762"/>
+            <a:ext cx="2177522" cy="576064"/>
+          </a:xfrm>
+          <a:prstGeom prst="roundRect">
+            <a:avLst/>
+          </a:prstGeom>
+          <a:solidFill>
+            <a:schemeClr val="accent1">
+              <a:lumMod val="40000"/>
+              <a:lumOff val="60000"/>
+            </a:schemeClr>
+          </a:solidFill>
+          <a:ln>
+            <a:solidFill>
+              <a:schemeClr val="accent1">
+                <a:lumMod val="20000"/>
+                <a:lumOff val="80000"/>
+              </a:schemeClr>
+            </a:solidFill>
+          </a:ln>
+        </p:spPr>
+        <p:style>
+          <a:lnRef idx="2">
+            <a:schemeClr val="accent1">
+              <a:shade val="50000"/>
+            </a:schemeClr>
+          </a:lnRef>
+          <a:fillRef idx="1">
+            <a:schemeClr val="accent1"/>
+          </a:fillRef>
+          <a:effectRef idx="0">
+            <a:schemeClr val="accent1"/>
+          </a:effectRef>
+          <a:fontRef idx="minor">
+            <a:schemeClr val="lt1"/>
+          </a:fontRef>
+        </p:style>
+        <p:txBody>
+          <a:bodyPr rtlCol="0" anchor="ctr"/>
+          <a:lstStyle/>
+          <a:p>
+            <a:pPr algn="ctr"/>
+            <a:r>
+              <a:rPr lang="en-AU" sz="1050" b="1">
+                <a:solidFill>
+                  <a:schemeClr val="accent1">
+                    <a:lumMod val="50000"/>
+                  </a:schemeClr>
+                </a:solidFill>
+              </a:rPr>
+              <a:t>Logic View</a:t>
+            </a:r>
+            <a:endParaRPr lang="en-AU" sz="1050" dirty="0">
+              <a:solidFill>
+                <a:schemeClr val="accent1">
+                  <a:lumMod val="50000"/>
+                </a:schemeClr>
+              </a:solidFill>
+            </a:endParaRPr>
+          </a:p>
+          <a:p>
+            <a:pPr algn="ctr"/>
+            <a:r>
+              <a:rPr lang="en-AU" sz="1050" dirty="0" err="1">
+                <a:solidFill>
+                  <a:schemeClr val="accent1">
+                    <a:lumMod val="50000"/>
+                  </a:schemeClr>
+                </a:solidFill>
+              </a:rPr>
+              <a:t>ben.dim</a:t>
+            </a:r>
+            <a:r>
+              <a:rPr lang="en-AU" sz="1050" dirty="0">
+                <a:solidFill>
+                  <a:schemeClr val="accent1">
+                    <a:lumMod val="50000"/>
+                  </a:schemeClr>
+                </a:solidFill>
+              </a:rPr>
+              <a:t>_&lt;table&gt;</a:t>
+            </a:r>
+            <a:r>
+              <a:rPr lang="en-AU" sz="1050" b="1" dirty="0">
+                <a:solidFill>
+                  <a:schemeClr val="accent1">
+                    <a:lumMod val="50000"/>
+                  </a:schemeClr>
+                </a:solidFill>
+              </a:rPr>
+              <a:t>_</a:t>
+            </a:r>
+            <a:r>
+              <a:rPr lang="en-AU" sz="1050" b="1" dirty="0" err="1">
+                <a:solidFill>
+                  <a:schemeClr val="accent1">
+                    <a:lumMod val="50000"/>
+                  </a:schemeClr>
+                </a:solidFill>
+              </a:rPr>
+              <a:t>Pit</a:t>
+            </a:r>
+            <a:r>
+              <a:rPr lang="en-AU" sz="1050" dirty="0" err="1">
+                <a:solidFill>
+                  <a:schemeClr val="accent1">
+                    <a:lumMod val="50000"/>
+                  </a:schemeClr>
+                </a:solidFill>
+              </a:rPr>
+              <a:t>_VW</a:t>
+            </a:r>
+            <a:endParaRPr lang="en-AU" sz="1050" dirty="0">
+              <a:solidFill>
+                <a:schemeClr val="accent1">
+                  <a:lumMod val="50000"/>
+                </a:schemeClr>
+              </a:solidFill>
+            </a:endParaRPr>
+          </a:p>
+        </p:txBody>
+      </p:sp>
+      <p:sp>
+        <p:nvSpPr>
+          <p:cNvPr id="11" name="TextBox 10"/>
+          <p:cNvSpPr txBox="1"/>
+          <p:nvPr/>
+        </p:nvSpPr>
+        <p:spPr>
+          <a:xfrm>
+            <a:off x="2826405" y="3243137"/>
+            <a:ext cx="1872208" cy="307777"/>
+          </a:xfrm>
+          <a:prstGeom prst="rect">
+            <a:avLst/>
+          </a:prstGeom>
+          <a:noFill/>
+        </p:spPr>
+        <p:txBody>
+          <a:bodyPr wrap="square" rtlCol="0">
+            <a:spAutoFit/>
+          </a:bodyPr>
+          <a:lstStyle/>
+          <a:p>
+            <a:pPr algn="ctr"/>
+            <a:r>
+              <a:rPr lang="en-AU" sz="1400" dirty="0">
+                <a:solidFill>
+                  <a:schemeClr val="bg1"/>
+                </a:solidFill>
+              </a:rPr>
+              <a:t>Presentation Layer</a:t>
+            </a:r>
+          </a:p>
+        </p:txBody>
+      </p:sp>
+      <p:sp>
+        <p:nvSpPr>
+          <p:cNvPr id="12" name="TextBox 11"/>
+          <p:cNvSpPr txBox="1"/>
+          <p:nvPr/>
+        </p:nvSpPr>
+        <p:spPr>
+          <a:xfrm>
+            <a:off x="2833400" y="3719132"/>
+            <a:ext cx="1872208" cy="307777"/>
+          </a:xfrm>
+          <a:prstGeom prst="rect">
+            <a:avLst/>
+          </a:prstGeom>
+          <a:noFill/>
+        </p:spPr>
+        <p:txBody>
+          <a:bodyPr wrap="square" rtlCol="0">
+            <a:spAutoFit/>
+          </a:bodyPr>
+          <a:lstStyle/>
+          <a:p>
+            <a:pPr algn="ctr"/>
+            <a:r>
+              <a:rPr lang="en-AU" sz="1400" dirty="0">
+                <a:solidFill>
+                  <a:schemeClr val="bg1"/>
+                </a:solidFill>
+              </a:rPr>
+              <a:t>Integration Layer</a:t>
+            </a:r>
+          </a:p>
+        </p:txBody>
+      </p:sp>
+      <p:sp>
+        <p:nvSpPr>
+          <p:cNvPr id="13" name="TextBox 12"/>
+          <p:cNvSpPr txBox="1"/>
+          <p:nvPr/>
+        </p:nvSpPr>
+        <p:spPr>
+          <a:xfrm>
+            <a:off x="2826405" y="826081"/>
+            <a:ext cx="1872208" cy="307777"/>
+          </a:xfrm>
+          <a:prstGeom prst="rect">
+            <a:avLst/>
+          </a:prstGeom>
+          <a:noFill/>
+        </p:spPr>
+        <p:txBody>
+          <a:bodyPr wrap="square" rtlCol="0">
+            <a:spAutoFit/>
+          </a:bodyPr>
+          <a:lstStyle/>
+          <a:p>
+            <a:pPr algn="ctr"/>
+            <a:r>
+              <a:rPr lang="en-AU" sz="1400" dirty="0">
+                <a:solidFill>
+                  <a:schemeClr val="bg1"/>
+                </a:solidFill>
+              </a:rPr>
+              <a:t>Business Intelligence</a:t>
+            </a:r>
+          </a:p>
+        </p:txBody>
+      </p:sp>
+      <p:cxnSp>
+        <p:nvCxnSpPr>
+          <p:cNvPr id="16" name="Straight Connector 15"/>
+          <p:cNvCxnSpPr/>
+          <p:nvPr/>
+        </p:nvCxnSpPr>
+        <p:spPr>
+          <a:xfrm flipV="1">
+            <a:off x="1687495" y="2301174"/>
+            <a:ext cx="0" cy="367175"/>
+          </a:xfrm>
+          <a:prstGeom prst="line">
+            <a:avLst/>
+          </a:prstGeom>
+          <a:ln>
+            <a:tailEnd type="arrow"/>
+          </a:ln>
+        </p:spPr>
+        <p:style>
+          <a:lnRef idx="3">
+            <a:schemeClr val="accent2"/>
+          </a:lnRef>
+          <a:fillRef idx="0">
+            <a:schemeClr val="accent2"/>
+          </a:fillRef>
+          <a:effectRef idx="2">
+            <a:schemeClr val="accent2"/>
+          </a:effectRef>
+          <a:fontRef idx="minor">
+            <a:schemeClr val="tx1"/>
+          </a:fontRef>
+        </p:style>
+      </p:cxnSp>
+      <p:sp>
+        <p:nvSpPr>
+          <p:cNvPr id="24" name="TextBox 23"/>
+          <p:cNvSpPr txBox="1"/>
+          <p:nvPr/>
+        </p:nvSpPr>
+        <p:spPr>
+          <a:xfrm>
+            <a:off x="11654" y="1516283"/>
+            <a:ext cx="1240888" cy="261610"/>
+          </a:xfrm>
+          <a:prstGeom prst="rect">
+            <a:avLst/>
+          </a:prstGeom>
+          <a:noFill/>
+        </p:spPr>
+        <p:txBody>
+          <a:bodyPr wrap="square" rtlCol="0">
+            <a:spAutoFit/>
+          </a:bodyPr>
+          <a:lstStyle/>
+          <a:p>
+            <a:pPr algn="ctr"/>
+            <a:r>
+              <a:rPr lang="en-AU" sz="1100" b="1" dirty="0" err="1"/>
+              <a:t>pres</a:t>
+            </a:r>
+            <a:r>
+              <a:rPr lang="en-AU" sz="1100" b="1" dirty="0"/>
+              <a:t> schema</a:t>
+            </a:r>
+          </a:p>
+        </p:txBody>
+      </p:sp>
+      <p:sp>
+        <p:nvSpPr>
+          <p:cNvPr id="25" name="TextBox 24"/>
+          <p:cNvSpPr txBox="1"/>
+          <p:nvPr/>
+        </p:nvSpPr>
+        <p:spPr>
+          <a:xfrm>
+            <a:off x="15825" y="2373803"/>
+            <a:ext cx="1240888" cy="261610"/>
+          </a:xfrm>
+          <a:prstGeom prst="rect">
+            <a:avLst/>
+          </a:prstGeom>
+          <a:noFill/>
+        </p:spPr>
+        <p:txBody>
+          <a:bodyPr wrap="square" rtlCol="0">
+            <a:spAutoFit/>
+          </a:bodyPr>
+          <a:lstStyle/>
+          <a:p>
+            <a:pPr algn="ctr"/>
+            <a:r>
+              <a:rPr lang="en-AU" sz="1100" b="1" dirty="0"/>
+              <a:t>ben schema</a:t>
+            </a:r>
+          </a:p>
+        </p:txBody>
+      </p:sp>
+      <p:cxnSp>
+        <p:nvCxnSpPr>
+          <p:cNvPr id="15" name="Straight Connector 14"/>
+          <p:cNvCxnSpPr>
+            <a:cxnSpLocks/>
+          </p:cNvCxnSpPr>
+          <p:nvPr/>
+        </p:nvCxnSpPr>
+        <p:spPr>
+          <a:xfrm flipV="1">
+            <a:off x="1687495" y="2924188"/>
+            <a:ext cx="0" cy="901068"/>
+          </a:xfrm>
+          <a:prstGeom prst="line">
+            <a:avLst/>
+          </a:prstGeom>
+          <a:ln>
+            <a:tailEnd type="arrow"/>
+          </a:ln>
+        </p:spPr>
+        <p:style>
+          <a:lnRef idx="3">
+            <a:schemeClr val="accent2"/>
+          </a:lnRef>
+          <a:fillRef idx="0">
+            <a:schemeClr val="accent2"/>
+          </a:fillRef>
+          <a:effectRef idx="2">
+            <a:schemeClr val="accent2"/>
+          </a:effectRef>
+          <a:fontRef idx="minor">
+            <a:schemeClr val="tx1"/>
+          </a:fontRef>
+        </p:style>
+      </p:cxnSp>
+      <p:cxnSp>
+        <p:nvCxnSpPr>
+          <p:cNvPr id="17" name="Straight Connector 16"/>
+          <p:cNvCxnSpPr/>
+          <p:nvPr/>
+        </p:nvCxnSpPr>
+        <p:spPr>
+          <a:xfrm flipV="1">
+            <a:off x="1687495" y="1725110"/>
+            <a:ext cx="0" cy="367175"/>
+          </a:xfrm>
+          <a:prstGeom prst="line">
+            <a:avLst/>
+          </a:prstGeom>
+          <a:ln>
+            <a:tailEnd type="arrow"/>
+          </a:ln>
+        </p:spPr>
+        <p:style>
+          <a:lnRef idx="3">
+            <a:schemeClr val="accent2"/>
+          </a:lnRef>
+          <a:fillRef idx="0">
+            <a:schemeClr val="accent2"/>
+          </a:fillRef>
+          <a:effectRef idx="2">
+            <a:schemeClr val="accent2"/>
+          </a:effectRef>
+          <a:fontRef idx="minor">
+            <a:schemeClr val="tx1"/>
+          </a:fontRef>
+        </p:style>
+      </p:cxnSp>
+      <p:sp>
+        <p:nvSpPr>
+          <p:cNvPr id="30" name="Left Brace 29"/>
+          <p:cNvSpPr/>
+          <p:nvPr/>
+        </p:nvSpPr>
+        <p:spPr>
+          <a:xfrm>
+            <a:off x="1085541" y="1412018"/>
+            <a:ext cx="144016" cy="496680"/>
+          </a:xfrm>
+          <a:prstGeom prst="leftBrace">
+            <a:avLst/>
+          </a:prstGeom>
+        </p:spPr>
+        <p:style>
+          <a:lnRef idx="1">
+            <a:schemeClr val="accent1"/>
+          </a:lnRef>
+          <a:fillRef idx="0">
+            <a:schemeClr val="accent1"/>
+          </a:fillRef>
+          <a:effectRef idx="0">
+            <a:schemeClr val="accent1"/>
+          </a:effectRef>
+          <a:fontRef idx="minor">
+            <a:schemeClr val="tx1"/>
+          </a:fontRef>
+        </p:style>
+        <p:txBody>
+          <a:bodyPr rtlCol="0" anchor="ctr"/>
+          <a:lstStyle/>
+          <a:p>
+            <a:pPr algn="ctr"/>
+            <a:endParaRPr lang="en-AU"/>
+          </a:p>
+        </p:txBody>
+      </p:sp>
+      <p:sp>
+        <p:nvSpPr>
+          <p:cNvPr id="31" name="Left Brace 30"/>
+          <p:cNvSpPr/>
+          <p:nvPr/>
+        </p:nvSpPr>
+        <p:spPr>
+          <a:xfrm>
+            <a:off x="1085541" y="1948390"/>
+            <a:ext cx="144016" cy="1112436"/>
+          </a:xfrm>
+          <a:prstGeom prst="leftBrace">
+            <a:avLst/>
+          </a:prstGeom>
+        </p:spPr>
+        <p:style>
+          <a:lnRef idx="1">
+            <a:schemeClr val="accent1"/>
+          </a:lnRef>
+          <a:fillRef idx="0">
+            <a:schemeClr val="accent1"/>
+          </a:fillRef>
+          <a:effectRef idx="0">
+            <a:schemeClr val="accent1"/>
+          </a:effectRef>
+          <a:fontRef idx="minor">
+            <a:schemeClr val="tx1"/>
+          </a:fontRef>
+        </p:style>
+        <p:txBody>
+          <a:bodyPr rtlCol="0" anchor="ctr"/>
+          <a:lstStyle/>
+          <a:p>
+            <a:pPr algn="ctr"/>
+            <a:endParaRPr lang="en-AU"/>
+          </a:p>
+        </p:txBody>
+      </p:sp>
+      <p:sp>
+        <p:nvSpPr>
+          <p:cNvPr id="34" name="TextBox 33">
+            <a:extLst>
+              <a:ext uri="{FF2B5EF4-FFF2-40B4-BE49-F238E27FC236}">
+                <a16:creationId xmlns:a16="http://schemas.microsoft.com/office/drawing/2014/main" id="{DC045134-85DD-4206-8FE6-3B8F7011A038}"/>
+              </a:ext>
+            </a:extLst>
+          </p:cNvPr>
+          <p:cNvSpPr txBox="1"/>
+          <p:nvPr/>
+        </p:nvSpPr>
+        <p:spPr>
+          <a:xfrm>
+            <a:off x="4012102" y="2066965"/>
+            <a:ext cx="1765957" cy="1077218"/>
+          </a:xfrm>
+          <a:prstGeom prst="rect">
+            <a:avLst/>
+          </a:prstGeom>
+          <a:noFill/>
+        </p:spPr>
+        <p:txBody>
+          <a:bodyPr wrap="square" rtlCol="0">
+            <a:spAutoFit/>
+          </a:bodyPr>
+          <a:lstStyle/>
+          <a:p>
+            <a:pPr algn="ctr"/>
+            <a:r>
+              <a:rPr lang="en-AU" sz="1600" dirty="0"/>
+              <a:t>Type 2 and  mixed history example (with table added for materialisation)</a:t>
+            </a:r>
+          </a:p>
+        </p:txBody>
+      </p:sp>
+      <p:sp>
+        <p:nvSpPr>
+          <p:cNvPr id="35" name="TextBox 34">
+            <a:extLst>
+              <a:ext uri="{FF2B5EF4-FFF2-40B4-BE49-F238E27FC236}">
+                <a16:creationId xmlns:a16="http://schemas.microsoft.com/office/drawing/2014/main" id="{C831BB2F-B8C2-4902-B214-F31C42C6E183}"/>
+              </a:ext>
+            </a:extLst>
+          </p:cNvPr>
+          <p:cNvSpPr txBox="1"/>
+          <p:nvPr/>
+        </p:nvSpPr>
+        <p:spPr>
+          <a:xfrm>
+            <a:off x="6225817" y="1322844"/>
+            <a:ext cx="2090589" cy="1446550"/>
+          </a:xfrm>
+          <a:prstGeom prst="rect">
+            <a:avLst/>
+          </a:prstGeom>
+          <a:noFill/>
+        </p:spPr>
+        <p:txBody>
+          <a:bodyPr wrap="square" rtlCol="0">
+            <a:spAutoFit/>
+          </a:bodyPr>
+          <a:lstStyle/>
+          <a:p>
+            <a:pPr algn="ctr"/>
+            <a:r>
+              <a:rPr lang="en-AU" sz="1100" dirty="0"/>
+              <a:t>Type 2 dimensions are considered an exception, in the sense that the majority of the tables are expected to be type 1.</a:t>
+            </a:r>
+          </a:p>
+          <a:p>
+            <a:pPr algn="ctr"/>
+            <a:endParaRPr lang="en-AU" sz="1100" dirty="0"/>
+          </a:p>
+          <a:p>
+            <a:pPr algn="ctr"/>
+            <a:r>
+              <a:rPr lang="en-AU" sz="1100" dirty="0"/>
+              <a:t>Therefore, these tables and views have a ‘_Pit’ suffix to identify them.</a:t>
+            </a:r>
+          </a:p>
+        </p:txBody>
+      </p:sp>
+    </p:spTree>
+    <p:extLst>
+      <p:ext uri="{BB962C8B-B14F-4D97-AF65-F5344CB8AC3E}">
+        <p14:creationId xmlns:p14="http://schemas.microsoft.com/office/powerpoint/2010/main" val="507085879"/>
       </p:ext>
     </p:extLst>
   </p:cSld>

</xml_diff>